<commit_message>
BuildHeap Youtube presentation started ArrayHeap fix for pull mehtod when pulling last element. Optimize minHeapifyRoot and maxHeapifyRoot Change the way a swap is done in maxHeapifyRoot
</commit_message>
<xml_diff>
--- a/Presentations/Heap.pptx
+++ b/Presentations/Heap.pptx
@@ -218,7 +218,7 @@
           <a:p>
             <a:fld id="{29DB3E0B-A6A6-426E-AE5B-1FF417788330}" type="datetimeFigureOut">
               <a:rPr lang="en-US" smtClean="0"/>
-              <a:t>3/2/2016</a:t>
+              <a:t>3/3/2016</a:t>
             </a:fld>
             <a:endParaRPr lang="en-US"/>
           </a:p>
@@ -701,7 +701,7 @@
           <a:p>
             <a:fld id="{5AAC60D9-CF6C-4C34-A0B5-61385093271F}" type="datetimeFigureOut">
               <a:rPr lang="en-US" smtClean="0"/>
-              <a:t>3/2/2016</a:t>
+              <a:t>3/3/2016</a:t>
             </a:fld>
             <a:endParaRPr lang="en-US"/>
           </a:p>
@@ -871,7 +871,7 @@
           <a:p>
             <a:fld id="{5AAC60D9-CF6C-4C34-A0B5-61385093271F}" type="datetimeFigureOut">
               <a:rPr lang="en-US" smtClean="0"/>
-              <a:t>3/2/2016</a:t>
+              <a:t>3/3/2016</a:t>
             </a:fld>
             <a:endParaRPr lang="en-US"/>
           </a:p>
@@ -1051,7 +1051,7 @@
           <a:p>
             <a:fld id="{5AAC60D9-CF6C-4C34-A0B5-61385093271F}" type="datetimeFigureOut">
               <a:rPr lang="en-US" smtClean="0"/>
-              <a:t>3/2/2016</a:t>
+              <a:t>3/3/2016</a:t>
             </a:fld>
             <a:endParaRPr lang="en-US"/>
           </a:p>
@@ -1221,7 +1221,7 @@
           <a:p>
             <a:fld id="{5AAC60D9-CF6C-4C34-A0B5-61385093271F}" type="datetimeFigureOut">
               <a:rPr lang="en-US" smtClean="0"/>
-              <a:t>3/2/2016</a:t>
+              <a:t>3/3/2016</a:t>
             </a:fld>
             <a:endParaRPr lang="en-US"/>
           </a:p>
@@ -1467,7 +1467,7 @@
           <a:p>
             <a:fld id="{5AAC60D9-CF6C-4C34-A0B5-61385093271F}" type="datetimeFigureOut">
               <a:rPr lang="en-US" smtClean="0"/>
-              <a:t>3/2/2016</a:t>
+              <a:t>3/3/2016</a:t>
             </a:fld>
             <a:endParaRPr lang="en-US"/>
           </a:p>
@@ -1699,7 +1699,7 @@
           <a:p>
             <a:fld id="{5AAC60D9-CF6C-4C34-A0B5-61385093271F}" type="datetimeFigureOut">
               <a:rPr lang="en-US" smtClean="0"/>
-              <a:t>3/2/2016</a:t>
+              <a:t>3/3/2016</a:t>
             </a:fld>
             <a:endParaRPr lang="en-US"/>
           </a:p>
@@ -2066,7 +2066,7 @@
           <a:p>
             <a:fld id="{5AAC60D9-CF6C-4C34-A0B5-61385093271F}" type="datetimeFigureOut">
               <a:rPr lang="en-US" smtClean="0"/>
-              <a:t>3/2/2016</a:t>
+              <a:t>3/3/2016</a:t>
             </a:fld>
             <a:endParaRPr lang="en-US"/>
           </a:p>
@@ -2184,7 +2184,7 @@
           <a:p>
             <a:fld id="{5AAC60D9-CF6C-4C34-A0B5-61385093271F}" type="datetimeFigureOut">
               <a:rPr lang="en-US" smtClean="0"/>
-              <a:t>3/2/2016</a:t>
+              <a:t>3/3/2016</a:t>
             </a:fld>
             <a:endParaRPr lang="en-US"/>
           </a:p>
@@ -2279,7 +2279,7 @@
           <a:p>
             <a:fld id="{5AAC60D9-CF6C-4C34-A0B5-61385093271F}" type="datetimeFigureOut">
               <a:rPr lang="en-US" smtClean="0"/>
-              <a:t>3/2/2016</a:t>
+              <a:t>3/3/2016</a:t>
             </a:fld>
             <a:endParaRPr lang="en-US"/>
           </a:p>
@@ -2556,7 +2556,7 @@
           <a:p>
             <a:fld id="{5AAC60D9-CF6C-4C34-A0B5-61385093271F}" type="datetimeFigureOut">
               <a:rPr lang="en-US" smtClean="0"/>
-              <a:t>3/2/2016</a:t>
+              <a:t>3/3/2016</a:t>
             </a:fld>
             <a:endParaRPr lang="en-US"/>
           </a:p>
@@ -2809,7 +2809,7 @@
           <a:p>
             <a:fld id="{5AAC60D9-CF6C-4C34-A0B5-61385093271F}" type="datetimeFigureOut">
               <a:rPr lang="en-US" smtClean="0"/>
-              <a:t>3/2/2016</a:t>
+              <a:t>3/3/2016</a:t>
             </a:fld>
             <a:endParaRPr lang="en-US"/>
           </a:p>
@@ -3022,7 +3022,7 @@
           <a:p>
             <a:fld id="{5AAC60D9-CF6C-4C34-A0B5-61385093271F}" type="datetimeFigureOut">
               <a:rPr lang="en-US" smtClean="0"/>
-              <a:t>3/2/2016</a:t>
+              <a:t>3/3/2016</a:t>
             </a:fld>
             <a:endParaRPr lang="en-US"/>
           </a:p>

</xml_diff>